<commit_message>
update figure 1 alternative
</commit_message>
<xml_diff>
--- a/3_output/fig1_alternative_sir_explanation.pptx
+++ b/3_output/fig1_alternative_sir_explanation.pptx
@@ -254,7 +254,7 @@
           <a:p>
             <a:fld id="{C75B078E-1423-48FB-9A8C-AD62E2E7D6BA}" type="datetimeFigureOut">
               <a:rPr lang="de-DE" smtClean="0"/>
-              <a:t>01.03.2024</a:t>
+              <a:t>03.03.2024</a:t>
             </a:fld>
             <a:endParaRPr lang="de-DE"/>
           </a:p>
@@ -424,7 +424,7 @@
           <a:p>
             <a:fld id="{C75B078E-1423-48FB-9A8C-AD62E2E7D6BA}" type="datetimeFigureOut">
               <a:rPr lang="de-DE" smtClean="0"/>
-              <a:t>01.03.2024</a:t>
+              <a:t>03.03.2024</a:t>
             </a:fld>
             <a:endParaRPr lang="de-DE"/>
           </a:p>
@@ -604,7 +604,7 @@
           <a:p>
             <a:fld id="{C75B078E-1423-48FB-9A8C-AD62E2E7D6BA}" type="datetimeFigureOut">
               <a:rPr lang="de-DE" smtClean="0"/>
-              <a:t>01.03.2024</a:t>
+              <a:t>03.03.2024</a:t>
             </a:fld>
             <a:endParaRPr lang="de-DE"/>
           </a:p>
@@ -774,7 +774,7 @@
           <a:p>
             <a:fld id="{C75B078E-1423-48FB-9A8C-AD62E2E7D6BA}" type="datetimeFigureOut">
               <a:rPr lang="de-DE" smtClean="0"/>
-              <a:t>01.03.2024</a:t>
+              <a:t>03.03.2024</a:t>
             </a:fld>
             <a:endParaRPr lang="de-DE"/>
           </a:p>
@@ -1018,7 +1018,7 @@
           <a:p>
             <a:fld id="{C75B078E-1423-48FB-9A8C-AD62E2E7D6BA}" type="datetimeFigureOut">
               <a:rPr lang="de-DE" smtClean="0"/>
-              <a:t>01.03.2024</a:t>
+              <a:t>03.03.2024</a:t>
             </a:fld>
             <a:endParaRPr lang="de-DE"/>
           </a:p>
@@ -1250,7 +1250,7 @@
           <a:p>
             <a:fld id="{C75B078E-1423-48FB-9A8C-AD62E2E7D6BA}" type="datetimeFigureOut">
               <a:rPr lang="de-DE" smtClean="0"/>
-              <a:t>01.03.2024</a:t>
+              <a:t>03.03.2024</a:t>
             </a:fld>
             <a:endParaRPr lang="de-DE"/>
           </a:p>
@@ -1617,7 +1617,7 @@
           <a:p>
             <a:fld id="{C75B078E-1423-48FB-9A8C-AD62E2E7D6BA}" type="datetimeFigureOut">
               <a:rPr lang="de-DE" smtClean="0"/>
-              <a:t>01.03.2024</a:t>
+              <a:t>03.03.2024</a:t>
             </a:fld>
             <a:endParaRPr lang="de-DE"/>
           </a:p>
@@ -1735,7 +1735,7 @@
           <a:p>
             <a:fld id="{C75B078E-1423-48FB-9A8C-AD62E2E7D6BA}" type="datetimeFigureOut">
               <a:rPr lang="de-DE" smtClean="0"/>
-              <a:t>01.03.2024</a:t>
+              <a:t>03.03.2024</a:t>
             </a:fld>
             <a:endParaRPr lang="de-DE"/>
           </a:p>
@@ -1830,7 +1830,7 @@
           <a:p>
             <a:fld id="{C75B078E-1423-48FB-9A8C-AD62E2E7D6BA}" type="datetimeFigureOut">
               <a:rPr lang="de-DE" smtClean="0"/>
-              <a:t>01.03.2024</a:t>
+              <a:t>03.03.2024</a:t>
             </a:fld>
             <a:endParaRPr lang="de-DE"/>
           </a:p>
@@ -2107,7 +2107,7 @@
           <a:p>
             <a:fld id="{C75B078E-1423-48FB-9A8C-AD62E2E7D6BA}" type="datetimeFigureOut">
               <a:rPr lang="de-DE" smtClean="0"/>
-              <a:t>01.03.2024</a:t>
+              <a:t>03.03.2024</a:t>
             </a:fld>
             <a:endParaRPr lang="de-DE"/>
           </a:p>
@@ -2364,7 +2364,7 @@
           <a:p>
             <a:fld id="{C75B078E-1423-48FB-9A8C-AD62E2E7D6BA}" type="datetimeFigureOut">
               <a:rPr lang="de-DE" smtClean="0"/>
-              <a:t>01.03.2024</a:t>
+              <a:t>03.03.2024</a:t>
             </a:fld>
             <a:endParaRPr lang="de-DE"/>
           </a:p>
@@ -2577,7 +2577,7 @@
           <a:p>
             <a:fld id="{C75B078E-1423-48FB-9A8C-AD62E2E7D6BA}" type="datetimeFigureOut">
               <a:rPr lang="de-DE" smtClean="0"/>
-              <a:t>01.03.2024</a:t>
+              <a:t>03.03.2024</a:t>
             </a:fld>
             <a:endParaRPr lang="de-DE"/>
           </a:p>
@@ -3471,8 +3471,8 @@
             <a:chExt cx="6354587" cy="2817142"/>
           </a:xfrm>
         </p:grpSpPr>
-        <mc:AlternateContent xmlns:mc="http://schemas.openxmlformats.org/markup-compatibility/2006" xmlns:a14="http://schemas.microsoft.com/office/drawing/2010/main">
-          <mc:Choice Requires="a14">
+        <mc:AlternateContent xmlns:mc="http://schemas.openxmlformats.org/markup-compatibility/2006">
+          <mc:Choice xmlns:a14="http://schemas.microsoft.com/office/drawing/2010/main" Requires="a14">
             <p:sp>
               <p:nvSpPr>
                 <p:cNvPr id="21" name="Freeform: Shape 20">
@@ -3742,12 +3742,8 @@
                     <a:rPr lang="en-US" kern="1200" dirty="0"/>
                   </a:br>
                   <a:r>
-                    <a:rPr lang="en-US" kern="1200" dirty="0"/>
-                    <a:t>IR </a:t>
-                  </a:r>
-                  <a:r>
                     <a:rPr lang="en-US" b="1" kern="1200" dirty="0"/>
-                    <a:t>of any LC </a:t>
+                    <a:t>IR of any LC </a:t>
                   </a:r>
                   <a:r>
                     <a:rPr lang="en-US" kern="1200" dirty="0"/>
@@ -3798,7 +3794,7 @@
               </p:txBody>
             </p:sp>
           </mc:Choice>
-          <mc:Fallback xmlns="">
+          <mc:Fallback>
             <p:sp>
               <p:nvSpPr>
                 <p:cNvPr id="21" name="Freeform: Shape 20">

</xml_diff>